<commit_message>
updating project file, add presentation file, add junk notebook
</commit_message>
<xml_diff>
--- a/NFLRank_final_WY.pptx
+++ b/NFLRank_final_WY.pptx
@@ -5,7 +5,7 @@
     <p:sldMasterId id="2147483678" r:id="rId1"/>
   </p:sldMasterIdLst>
   <p:notesMasterIdLst>
-    <p:notesMasterId r:id="rId10"/>
+    <p:notesMasterId r:id="rId13"/>
   </p:notesMasterIdLst>
   <p:sldIdLst>
     <p:sldId id="256" r:id="rId2"/>
@@ -15,7 +15,10 @@
     <p:sldId id="262" r:id="rId6"/>
     <p:sldId id="261" r:id="rId7"/>
     <p:sldId id="268" r:id="rId8"/>
-    <p:sldId id="269" r:id="rId9"/>
+    <p:sldId id="270" r:id="rId9"/>
+    <p:sldId id="269" r:id="rId10"/>
+    <p:sldId id="271" r:id="rId11"/>
+    <p:sldId id="272" r:id="rId12"/>
   </p:sldIdLst>
   <p:sldSz cx="12192000" cy="6858000"/>
   <p:notesSz cx="6858000" cy="9144000"/>
@@ -204,7 +207,7 @@
           <a:p>
             <a:fld id="{EFAD2766-2C69-4467-A334-08711492AB24}" type="datetimeFigureOut">
               <a:rPr lang="en-US" smtClean="0"/>
-              <a:t>2/11/18</a:t>
+              <a:t>2/13/18</a:t>
             </a:fld>
             <a:endParaRPr lang="en-US"/>
           </a:p>
@@ -860,7 +863,7 @@
           <a:p>
             <a:fld id="{8FF56DA0-41E4-4345-B5E7-12CA85C00467}" type="datetimeFigureOut">
               <a:rPr lang="en-US" smtClean="0"/>
-              <a:t>2/11/18</a:t>
+              <a:t>2/13/18</a:t>
             </a:fld>
             <a:endParaRPr lang="en-US"/>
           </a:p>
@@ -1050,7 +1053,7 @@
           <a:p>
             <a:fld id="{8FF56DA0-41E4-4345-B5E7-12CA85C00467}" type="datetimeFigureOut">
               <a:rPr lang="en-US" smtClean="0"/>
-              <a:t>2/11/18</a:t>
+              <a:t>2/13/18</a:t>
             </a:fld>
             <a:endParaRPr lang="en-US"/>
           </a:p>
@@ -1230,7 +1233,7 @@
           <a:p>
             <a:fld id="{8FF56DA0-41E4-4345-B5E7-12CA85C00467}" type="datetimeFigureOut">
               <a:rPr lang="en-US" smtClean="0"/>
-              <a:t>2/11/18</a:t>
+              <a:t>2/13/18</a:t>
             </a:fld>
             <a:endParaRPr lang="en-US"/>
           </a:p>
@@ -1400,7 +1403,7 @@
           <a:p>
             <a:fld id="{8FF56DA0-41E4-4345-B5E7-12CA85C00467}" type="datetimeFigureOut">
               <a:rPr lang="en-US" smtClean="0"/>
-              <a:t>2/11/18</a:t>
+              <a:t>2/13/18</a:t>
             </a:fld>
             <a:endParaRPr lang="en-US"/>
           </a:p>
@@ -1656,7 +1659,7 @@
           <a:p>
             <a:fld id="{8FF56DA0-41E4-4345-B5E7-12CA85C00467}" type="datetimeFigureOut">
               <a:rPr lang="en-US" smtClean="0"/>
-              <a:t>2/11/18</a:t>
+              <a:t>2/13/18</a:t>
             </a:fld>
             <a:endParaRPr lang="en-US"/>
           </a:p>
@@ -1944,7 +1947,7 @@
           <a:p>
             <a:fld id="{8FF56DA0-41E4-4345-B5E7-12CA85C00467}" type="datetimeFigureOut">
               <a:rPr lang="en-US" smtClean="0"/>
-              <a:t>2/11/18</a:t>
+              <a:t>2/13/18</a:t>
             </a:fld>
             <a:endParaRPr lang="en-US"/>
           </a:p>
@@ -2382,7 +2385,7 @@
           <a:p>
             <a:fld id="{8FF56DA0-41E4-4345-B5E7-12CA85C00467}" type="datetimeFigureOut">
               <a:rPr lang="en-US" smtClean="0"/>
-              <a:t>2/11/18</a:t>
+              <a:t>2/13/18</a:t>
             </a:fld>
             <a:endParaRPr lang="en-US"/>
           </a:p>
@@ -2500,7 +2503,7 @@
           <a:p>
             <a:fld id="{8FF56DA0-41E4-4345-B5E7-12CA85C00467}" type="datetimeFigureOut">
               <a:rPr lang="en-US" smtClean="0"/>
-              <a:t>2/11/18</a:t>
+              <a:t>2/13/18</a:t>
             </a:fld>
             <a:endParaRPr lang="en-US"/>
           </a:p>
@@ -2595,7 +2598,7 @@
           <a:p>
             <a:fld id="{8FF56DA0-41E4-4345-B5E7-12CA85C00467}" type="datetimeFigureOut">
               <a:rPr lang="en-US" smtClean="0"/>
-              <a:t>2/11/18</a:t>
+              <a:t>2/13/18</a:t>
             </a:fld>
             <a:endParaRPr lang="en-US"/>
           </a:p>
@@ -2951,7 +2954,7 @@
           <a:p>
             <a:fld id="{8FF56DA0-41E4-4345-B5E7-12CA85C00467}" type="datetimeFigureOut">
               <a:rPr lang="en-US" smtClean="0"/>
-              <a:t>2/11/18</a:t>
+              <a:t>2/13/18</a:t>
             </a:fld>
             <a:endParaRPr lang="en-US"/>
           </a:p>
@@ -3267,7 +3270,7 @@
           <a:p>
             <a:fld id="{8FF56DA0-41E4-4345-B5E7-12CA85C00467}" type="datetimeFigureOut">
               <a:rPr lang="en-US" smtClean="0"/>
-              <a:t>2/11/18</a:t>
+              <a:t>2/13/18</a:t>
             </a:fld>
             <a:endParaRPr lang="en-US"/>
           </a:p>
@@ -3500,7 +3503,7 @@
           <a:p>
             <a:fld id="{8FF56DA0-41E4-4345-B5E7-12CA85C00467}" type="datetimeFigureOut">
               <a:rPr lang="en-US" smtClean="0"/>
-              <a:t>2/11/18</a:t>
+              <a:t>2/13/18</a:t>
             </a:fld>
             <a:endParaRPr lang="en-US"/>
           </a:p>
@@ -3992,11 +3995,7 @@
           <a:p>
             <a:r>
               <a:rPr lang="en-US" dirty="0" smtClean="0"/>
-              <a:t>February 14, </a:t>
-            </a:r>
-            <a:r>
-              <a:rPr lang="en-US" dirty="0" smtClean="0"/>
-              <a:t>2018</a:t>
+              <a:t>February 14, 2018</a:t>
             </a:r>
           </a:p>
           <a:p>
@@ -4012,6 +4011,150 @@
     <p:extLst>
       <p:ext uri="{BB962C8B-B14F-4D97-AF65-F5344CB8AC3E}">
         <p14:creationId xmlns:p14="http://schemas.microsoft.com/office/powerpoint/2010/main" val="2901355231"/>
+      </p:ext>
+    </p:extLst>
+  </p:cSld>
+  <p:clrMapOvr>
+    <a:masterClrMapping/>
+  </p:clrMapOvr>
+</p:sld>
+</file>
+
+<file path=ppt/slides/slide10.xml><?xml version="1.0" encoding="utf-8"?>
+<p:sld xmlns:a="http://schemas.openxmlformats.org/drawingml/2006/main" xmlns:r="http://schemas.openxmlformats.org/officeDocument/2006/relationships" xmlns:p="http://schemas.openxmlformats.org/presentationml/2006/main">
+  <p:cSld>
+    <p:spTree>
+      <p:nvGrpSpPr>
+        <p:cNvPr id="1" name=""/>
+        <p:cNvGrpSpPr/>
+        <p:nvPr/>
+      </p:nvGrpSpPr>
+      <p:grpSpPr>
+        <a:xfrm>
+          <a:off x="0" y="0"/>
+          <a:ext cx="0" cy="0"/>
+          <a:chOff x="0" y="0"/>
+          <a:chExt cx="0" cy="0"/>
+        </a:xfrm>
+      </p:grpSpPr>
+      <p:sp>
+        <p:nvSpPr>
+          <p:cNvPr id="2" name="Title 1"/>
+          <p:cNvSpPr>
+            <a:spLocks noGrp="1"/>
+          </p:cNvSpPr>
+          <p:nvPr>
+            <p:ph type="title"/>
+          </p:nvPr>
+        </p:nvSpPr>
+        <p:spPr/>
+        <p:txBody>
+          <a:bodyPr/>
+          <a:lstStyle/>
+          <a:p>
+            <a:r>
+              <a:rPr lang="en-US" dirty="0" smtClean="0"/>
+              <a:t>Linear Regression</a:t>
+            </a:r>
+            <a:endParaRPr lang="en-US" dirty="0"/>
+          </a:p>
+        </p:txBody>
+      </p:sp>
+      <p:sp>
+        <p:nvSpPr>
+          <p:cNvPr id="3" name="Content Placeholder 2"/>
+          <p:cNvSpPr>
+            <a:spLocks noGrp="1"/>
+          </p:cNvSpPr>
+          <p:nvPr>
+            <p:ph idx="1"/>
+          </p:nvPr>
+        </p:nvSpPr>
+        <p:spPr/>
+        <p:txBody>
+          <a:bodyPr/>
+          <a:lstStyle/>
+          <a:p>
+            <a:endParaRPr lang="en-US"/>
+          </a:p>
+        </p:txBody>
+      </p:sp>
+    </p:spTree>
+    <p:extLst>
+      <p:ext uri="{BB962C8B-B14F-4D97-AF65-F5344CB8AC3E}">
+        <p14:creationId xmlns:p14="http://schemas.microsoft.com/office/powerpoint/2010/main" val="3787847472"/>
+      </p:ext>
+    </p:extLst>
+  </p:cSld>
+  <p:clrMapOvr>
+    <a:masterClrMapping/>
+  </p:clrMapOvr>
+</p:sld>
+</file>
+
+<file path=ppt/slides/slide11.xml><?xml version="1.0" encoding="utf-8"?>
+<p:sld xmlns:a="http://schemas.openxmlformats.org/drawingml/2006/main" xmlns:r="http://schemas.openxmlformats.org/officeDocument/2006/relationships" xmlns:p="http://schemas.openxmlformats.org/presentationml/2006/main">
+  <p:cSld>
+    <p:spTree>
+      <p:nvGrpSpPr>
+        <p:cNvPr id="1" name=""/>
+        <p:cNvGrpSpPr/>
+        <p:nvPr/>
+      </p:nvGrpSpPr>
+      <p:grpSpPr>
+        <a:xfrm>
+          <a:off x="0" y="0"/>
+          <a:ext cx="0" cy="0"/>
+          <a:chOff x="0" y="0"/>
+          <a:chExt cx="0" cy="0"/>
+        </a:xfrm>
+      </p:grpSpPr>
+      <p:sp>
+        <p:nvSpPr>
+          <p:cNvPr id="2" name="Title 1"/>
+          <p:cNvSpPr>
+            <a:spLocks noGrp="1"/>
+          </p:cNvSpPr>
+          <p:nvPr>
+            <p:ph type="title"/>
+          </p:nvPr>
+        </p:nvSpPr>
+        <p:spPr/>
+        <p:txBody>
+          <a:bodyPr/>
+          <a:lstStyle/>
+          <a:p>
+            <a:r>
+              <a:rPr lang="en-US" dirty="0" smtClean="0"/>
+              <a:t>Conclusions and Future Work</a:t>
+            </a:r>
+            <a:endParaRPr lang="en-US" dirty="0"/>
+          </a:p>
+        </p:txBody>
+      </p:sp>
+      <p:sp>
+        <p:nvSpPr>
+          <p:cNvPr id="3" name="Content Placeholder 2"/>
+          <p:cNvSpPr>
+            <a:spLocks noGrp="1"/>
+          </p:cNvSpPr>
+          <p:nvPr>
+            <p:ph idx="1"/>
+          </p:nvPr>
+        </p:nvSpPr>
+        <p:spPr/>
+        <p:txBody>
+          <a:bodyPr/>
+          <a:lstStyle/>
+          <a:p>
+            <a:endParaRPr lang="en-US"/>
+          </a:p>
+        </p:txBody>
+      </p:sp>
+    </p:spTree>
+    <p:extLst>
+      <p:ext uri="{BB962C8B-B14F-4D97-AF65-F5344CB8AC3E}">
+        <p14:creationId xmlns:p14="http://schemas.microsoft.com/office/powerpoint/2010/main" val="2547115747"/>
       </p:ext>
     </p:extLst>
   </p:cSld>
@@ -4094,7 +4237,6 @@
               <a:rPr lang="en-US" dirty="0" smtClean="0"/>
               <a:t>The ability to predict player rank accurately can lead to better drafting and ultimately winning the fantasy league</a:t>
             </a:r>
-            <a:endParaRPr lang="en-US" dirty="0" smtClean="0"/>
           </a:p>
           <a:p>
             <a:endParaRPr lang="en-US" dirty="0"/>
@@ -4438,11 +4580,7 @@
             </a:pPr>
             <a:r>
               <a:rPr lang="en-US" dirty="0" smtClean="0"/>
-              <a:t>This pulls JSON files from NFL </a:t>
-            </a:r>
-            <a:r>
-              <a:rPr lang="en-US" dirty="0" smtClean="0"/>
-              <a:t>API</a:t>
+              <a:t>This pulls JSON files from NFL API</a:t>
             </a:r>
           </a:p>
           <a:p>
@@ -4550,11 +4688,7 @@
           <a:p>
             <a:r>
               <a:rPr lang="en-US" dirty="0" smtClean="0"/>
-              <a:t>This data set contained all players in the NFL, </a:t>
-            </a:r>
-            <a:r>
-              <a:rPr lang="en-US" dirty="0" smtClean="0"/>
-              <a:t>I was only interested in </a:t>
+              <a:t>This data set contained all players in the NFL, I was only interested in </a:t>
             </a:r>
             <a:r>
               <a:rPr lang="nl-NL" dirty="0"/>
@@ -4699,10 +4833,6 @@
               <a:rPr lang="en-US" dirty="0"/>
               <a:t>• Passing Yards: 1 point per 25 yards • Passing Touchdowns: 4 points</a:t>
             </a:r>
-            <a:r>
-              <a:rPr lang="en-US" dirty="0"/>
-              <a:t/>
-            </a:r>
             <a:br>
               <a:rPr lang="en-US" dirty="0"/>
             </a:br>
@@ -4710,10 +4840,6 @@
               <a:rPr lang="en-US" dirty="0"/>
               <a:t>• Passing Interceptions: -2 points</a:t>
             </a:r>
-            <a:r>
-              <a:rPr lang="en-US" dirty="0"/>
-              <a:t/>
-            </a:r>
             <a:br>
               <a:rPr lang="en-US" dirty="0"/>
             </a:br>
@@ -4721,10 +4847,6 @@
               <a:rPr lang="en-US" dirty="0"/>
               <a:t>• Rushing Yards: 1 point per 10 yards</a:t>
             </a:r>
-            <a:r>
-              <a:rPr lang="en-US" dirty="0"/>
-              <a:t/>
-            </a:r>
             <a:br>
               <a:rPr lang="en-US" dirty="0"/>
             </a:br>
@@ -4732,10 +4854,6 @@
               <a:rPr lang="en-US" dirty="0"/>
               <a:t>• Rushing Touchdowns: 6 points</a:t>
             </a:r>
-            <a:r>
-              <a:rPr lang="en-US" dirty="0"/>
-              <a:t/>
-            </a:r>
             <a:br>
               <a:rPr lang="en-US" dirty="0"/>
             </a:br>
@@ -4743,10 +4861,6 @@
               <a:rPr lang="en-US" dirty="0"/>
               <a:t>• Receptions: 1 points (only if using PPR scoring)</a:t>
             </a:r>
-            <a:r>
-              <a:rPr lang="en-US" dirty="0"/>
-              <a:t/>
-            </a:r>
             <a:br>
               <a:rPr lang="en-US" dirty="0"/>
             </a:br>
@@ -4754,10 +4868,6 @@
               <a:rPr lang="en-US" dirty="0"/>
               <a:t>• Receiving Yards: 1 point per 10 yards</a:t>
             </a:r>
-            <a:r>
-              <a:rPr lang="en-US" dirty="0"/>
-              <a:t/>
-            </a:r>
             <a:br>
               <a:rPr lang="en-US" dirty="0"/>
             </a:br>
@@ -4765,10 +4875,6 @@
               <a:rPr lang="en-US" dirty="0"/>
               <a:t>• Receiving Touchdowns: 6 points</a:t>
             </a:r>
-            <a:r>
-              <a:rPr lang="en-US" dirty="0"/>
-              <a:t/>
-            </a:r>
             <a:br>
               <a:rPr lang="en-US" dirty="0"/>
             </a:br>
@@ -4776,10 +4882,6 @@
               <a:rPr lang="en-US" dirty="0"/>
               <a:t>• 2-Point Conversions: 2 points</a:t>
             </a:r>
-            <a:r>
-              <a:rPr lang="en-US" dirty="0"/>
-              <a:t/>
-            </a:r>
             <a:br>
               <a:rPr lang="en-US" dirty="0"/>
             </a:br>
@@ -4787,10 +4889,6 @@
               <a:rPr lang="en-US" dirty="0"/>
               <a:t>• Fumbles Lost: -2 points</a:t>
             </a:r>
-            <a:r>
-              <a:rPr lang="en-US" dirty="0"/>
-              <a:t/>
-            </a:r>
             <a:br>
               <a:rPr lang="en-US" dirty="0"/>
             </a:br>
@@ -4798,10 +4896,6 @@
               <a:rPr lang="en-US" dirty="0"/>
               <a:t>• Fumble Recovered for a Touchdown: 6 points</a:t>
             </a:r>
-            <a:r>
-              <a:rPr lang="en-US" dirty="0"/>
-              <a:t/>
-            </a:r>
             <a:br>
               <a:rPr lang="en-US" dirty="0"/>
             </a:br>
@@ -4820,10 +4914,6 @@
               <a:rPr lang="en-US" dirty="0"/>
               <a:t>• Point After Touchdown (PAT) Made: 1 point</a:t>
             </a:r>
-            <a:r>
-              <a:rPr lang="en-US" dirty="0"/>
-              <a:t/>
-            </a:r>
             <a:br>
               <a:rPr lang="en-US" dirty="0"/>
             </a:br>
@@ -4831,10 +4921,6 @@
               <a:rPr lang="en-US" dirty="0"/>
               <a:t>• Field Goal (FG) Made (0-49 yards): 3 points</a:t>
             </a:r>
-            <a:r>
-              <a:rPr lang="en-US" dirty="0"/>
-              <a:t/>
-            </a:r>
             <a:br>
               <a:rPr lang="en-US" dirty="0"/>
             </a:br>
@@ -4842,7 +4928,6 @@
               <a:rPr lang="en-US" dirty="0"/>
               <a:t>• FG Made (50+ yards): 5 points</a:t>
             </a:r>
-            <a:endParaRPr lang="en-US" dirty="0"/>
           </a:p>
         </p:txBody>
       </p:sp>
@@ -4915,7 +5000,11 @@
           <a:bodyPr/>
           <a:lstStyle/>
           <a:p>
-            <a:endParaRPr lang="en-US"/>
+            <a:r>
+              <a:rPr lang="en-US" dirty="0" smtClean="0"/>
+              <a:t>Visualizing Data</a:t>
+            </a:r>
+            <a:endParaRPr lang="en-US" dirty="0"/>
           </a:p>
         </p:txBody>
       </p:sp>
@@ -4929,12 +5018,126 @@
             <p:ph idx="1"/>
           </p:nvPr>
         </p:nvSpPr>
-        <p:spPr/>
-        <p:txBody>
-          <a:bodyPr/>
-          <a:lstStyle/>
-          <a:p>
-            <a:endParaRPr lang="en-US"/>
+        <p:spPr>
+          <a:xfrm>
+            <a:off x="5338666" y="2011680"/>
+            <a:ext cx="6091715" cy="3766185"/>
+          </a:xfrm>
+        </p:spPr>
+        <p:txBody>
+          <a:bodyPr/>
+          <a:lstStyle/>
+          <a:p>
+            <a:r>
+              <a:rPr lang="en-US" dirty="0" smtClean="0"/>
+              <a:t>Plotted all of the points as box plots to see if anything was an obvious predictor.</a:t>
+            </a:r>
+          </a:p>
+          <a:p>
+            <a:endParaRPr lang="en-US" dirty="0"/>
+          </a:p>
+          <a:p>
+            <a:r>
+              <a:rPr lang="en-US" dirty="0" smtClean="0"/>
+              <a:t>Seems like Total Points has the most outliers along with rushing/receiving yards and touchdowns</a:t>
+            </a:r>
+            <a:endParaRPr lang="en-US" dirty="0"/>
+          </a:p>
+        </p:txBody>
+      </p:sp>
+      <p:pic>
+        <p:nvPicPr>
+          <p:cNvPr id="4" name="Picture 3"/>
+          <p:cNvPicPr>
+            <a:picLocks noChangeAspect="1"/>
+          </p:cNvPicPr>
+          <p:nvPr/>
+        </p:nvPicPr>
+        <p:blipFill>
+          <a:blip r:embed="rId2"/>
+          <a:stretch>
+            <a:fillRect/>
+          </a:stretch>
+        </p:blipFill>
+        <p:spPr>
+          <a:xfrm>
+            <a:off x="623791" y="2011680"/>
+            <a:ext cx="4714875" cy="4048125"/>
+          </a:xfrm>
+          <a:prstGeom prst="rect">
+            <a:avLst/>
+          </a:prstGeom>
+        </p:spPr>
+      </p:pic>
+    </p:spTree>
+    <p:extLst>
+      <p:ext uri="{BB962C8B-B14F-4D97-AF65-F5344CB8AC3E}">
+        <p14:creationId xmlns:p14="http://schemas.microsoft.com/office/powerpoint/2010/main" val="3755689968"/>
+      </p:ext>
+    </p:extLst>
+  </p:cSld>
+  <p:clrMapOvr>
+    <a:masterClrMapping/>
+  </p:clrMapOvr>
+</p:sld>
+</file>
+
+<file path=ppt/slides/slide9.xml><?xml version="1.0" encoding="utf-8"?>
+<p:sld xmlns:a="http://schemas.openxmlformats.org/drawingml/2006/main" xmlns:r="http://schemas.openxmlformats.org/officeDocument/2006/relationships" xmlns:p="http://schemas.openxmlformats.org/presentationml/2006/main">
+  <p:cSld>
+    <p:spTree>
+      <p:nvGrpSpPr>
+        <p:cNvPr id="1" name=""/>
+        <p:cNvGrpSpPr/>
+        <p:nvPr/>
+      </p:nvGrpSpPr>
+      <p:grpSpPr>
+        <a:xfrm>
+          <a:off x="0" y="0"/>
+          <a:ext cx="0" cy="0"/>
+          <a:chOff x="0" y="0"/>
+          <a:chExt cx="0" cy="0"/>
+        </a:xfrm>
+      </p:grpSpPr>
+      <p:sp>
+        <p:nvSpPr>
+          <p:cNvPr id="2" name="Title 1"/>
+          <p:cNvSpPr>
+            <a:spLocks noGrp="1"/>
+          </p:cNvSpPr>
+          <p:nvPr>
+            <p:ph type="title"/>
+          </p:nvPr>
+        </p:nvSpPr>
+        <p:spPr/>
+        <p:txBody>
+          <a:bodyPr/>
+          <a:lstStyle/>
+          <a:p>
+            <a:r>
+              <a:rPr lang="en-US" dirty="0" smtClean="0"/>
+              <a:t>Random Forest</a:t>
+            </a:r>
+            <a:endParaRPr lang="en-US" dirty="0"/>
+          </a:p>
+        </p:txBody>
+      </p:sp>
+      <p:sp>
+        <p:nvSpPr>
+          <p:cNvPr id="3" name="Content Placeholder 2"/>
+          <p:cNvSpPr>
+            <a:spLocks noGrp="1"/>
+          </p:cNvSpPr>
+          <p:nvPr>
+            <p:ph idx="1"/>
+          </p:nvPr>
+        </p:nvSpPr>
+        <p:spPr/>
+        <p:txBody>
+          <a:bodyPr/>
+          <a:lstStyle/>
+          <a:p>
+            <a:endParaRPr lang="en-US" dirty="0"/>
           </a:p>
         </p:txBody>
       </p:sp>

</xml_diff>

<commit_message>
adding final presentation files
</commit_message>
<xml_diff>
--- a/NFLRank_final_WY.pptx
+++ b/NFLRank_final_WY.pptx
@@ -5,7 +5,7 @@
     <p:sldMasterId id="2147483678" r:id="rId1"/>
   </p:sldMasterIdLst>
   <p:notesMasterIdLst>
-    <p:notesMasterId r:id="rId13"/>
+    <p:notesMasterId r:id="rId14"/>
   </p:notesMasterIdLst>
   <p:sldIdLst>
     <p:sldId id="256" r:id="rId2"/>
@@ -19,6 +19,7 @@
     <p:sldId id="269" r:id="rId10"/>
     <p:sldId id="271" r:id="rId11"/>
     <p:sldId id="272" r:id="rId12"/>
+    <p:sldId id="273" r:id="rId13"/>
   </p:sldIdLst>
   <p:sldSz cx="12192000" cy="6858000"/>
   <p:notesSz cx="6858000" cy="9144000"/>
@@ -4070,15 +4071,63 @@
             <p:ph idx="1"/>
           </p:nvPr>
         </p:nvSpPr>
-        <p:spPr/>
-        <p:txBody>
-          <a:bodyPr/>
-          <a:lstStyle/>
-          <a:p>
-            <a:endParaRPr lang="en-US"/>
-          </a:p>
-        </p:txBody>
-      </p:sp>
+        <p:spPr>
+          <a:xfrm>
+            <a:off x="6352674" y="2011680"/>
+            <a:ext cx="5077707" cy="3766185"/>
+          </a:xfrm>
+        </p:spPr>
+        <p:txBody>
+          <a:bodyPr/>
+          <a:lstStyle/>
+          <a:p>
+            <a:r>
+              <a:rPr lang="en-US" dirty="0" smtClean="0"/>
+              <a:t>RMSE = 74.76</a:t>
+            </a:r>
+          </a:p>
+          <a:p>
+            <a:r>
+              <a:rPr lang="en-US" dirty="0" smtClean="0"/>
+              <a:t>Null RMSE = 80.80</a:t>
+            </a:r>
+          </a:p>
+          <a:p>
+            <a:endParaRPr lang="en-US" dirty="0"/>
+          </a:p>
+          <a:p>
+            <a:r>
+              <a:rPr lang="en-US" dirty="0" smtClean="0"/>
+              <a:t>My model does better than null!</a:t>
+            </a:r>
+            <a:endParaRPr lang="en-US" dirty="0"/>
+          </a:p>
+        </p:txBody>
+      </p:sp>
+      <p:pic>
+        <p:nvPicPr>
+          <p:cNvPr id="4" name="Picture 3"/>
+          <p:cNvPicPr>
+            <a:picLocks noChangeAspect="1"/>
+          </p:cNvPicPr>
+          <p:nvPr/>
+        </p:nvPicPr>
+        <p:blipFill>
+          <a:blip r:embed="rId2"/>
+          <a:stretch>
+            <a:fillRect/>
+          </a:stretch>
+        </p:blipFill>
+        <p:spPr>
+          <a:xfrm>
+            <a:off x="559969" y="2157731"/>
+            <a:ext cx="5578886" cy="2715058"/>
+          </a:xfrm>
+          <a:prstGeom prst="rect">
+            <a:avLst/>
+          </a:prstGeom>
+        </p:spPr>
+      </p:pic>
     </p:spTree>
     <p:extLst>
       <p:ext uri="{BB962C8B-B14F-4D97-AF65-F5344CB8AC3E}">
@@ -4126,7 +4175,7 @@
           <a:p>
             <a:r>
               <a:rPr lang="en-US" dirty="0" smtClean="0"/>
-              <a:t>Conclusions and Future Work</a:t>
+              <a:t>Conclusions</a:t>
             </a:r>
             <a:endParaRPr lang="en-US" dirty="0"/>
           </a:p>
@@ -4144,10 +4193,63 @@
         </p:nvSpPr>
         <p:spPr/>
         <p:txBody>
-          <a:bodyPr/>
-          <a:lstStyle/>
-          <a:p>
-            <a:endParaRPr lang="en-US"/>
+          <a:bodyPr>
+            <a:normAutofit/>
+          </a:bodyPr>
+          <a:lstStyle/>
+          <a:p>
+            <a:r>
+              <a:rPr lang="en-US" dirty="0" smtClean="0"/>
+              <a:t>Random forest was able to determine the most important features</a:t>
+            </a:r>
+          </a:p>
+          <a:p>
+            <a:endParaRPr lang="en-US" dirty="0"/>
+          </a:p>
+          <a:p>
+            <a:r>
+              <a:rPr lang="en-US" dirty="0" smtClean="0"/>
+              <a:t>Linear regression was able to predict how player’s performance may change player rank by interpreting the coefficients.</a:t>
+            </a:r>
+          </a:p>
+          <a:p>
+            <a:pPr lvl="1"/>
+            <a:r>
+              <a:rPr lang="en-US" dirty="0" smtClean="0"/>
+              <a:t>A </a:t>
+            </a:r>
+            <a:r>
+              <a:rPr lang="en-US" dirty="0"/>
+              <a:t>player would have to gain ~1 rushing or receiving yard point to improve their rank by 1. Based on the point mapping, that means they would have to gain at least 10 more yards to improve their rank. </a:t>
+            </a:r>
+            <a:endParaRPr lang="en-US" dirty="0" smtClean="0"/>
+          </a:p>
+          <a:p>
+            <a:pPr lvl="1"/>
+            <a:r>
+              <a:rPr lang="en-US" dirty="0" smtClean="0"/>
+              <a:t>A players </a:t>
+            </a:r>
+            <a:r>
+              <a:rPr lang="en-US" dirty="0"/>
+              <a:t>would have to gain ~8 </a:t>
+            </a:r>
+            <a:r>
+              <a:rPr lang="en-US" dirty="0" smtClean="0"/>
+              <a:t>total points </a:t>
+            </a:r>
+            <a:r>
+              <a:rPr lang="en-US" dirty="0"/>
+              <a:t>in order to improve their rank by 1.</a:t>
+            </a:r>
+            <a:r>
+              <a:rPr lang="en-US" dirty="0"/>
+              <a:t/>
+            </a:r>
+            <a:br>
+              <a:rPr lang="en-US" dirty="0"/>
+            </a:br>
+            <a:endParaRPr lang="en-US" dirty="0"/>
           </a:p>
         </p:txBody>
       </p:sp>
@@ -4155,6 +4257,128 @@
     <p:extLst>
       <p:ext uri="{BB962C8B-B14F-4D97-AF65-F5344CB8AC3E}">
         <p14:creationId xmlns:p14="http://schemas.microsoft.com/office/powerpoint/2010/main" val="2547115747"/>
+      </p:ext>
+    </p:extLst>
+  </p:cSld>
+  <p:clrMapOvr>
+    <a:masterClrMapping/>
+  </p:clrMapOvr>
+</p:sld>
+</file>
+
+<file path=ppt/slides/slide12.xml><?xml version="1.0" encoding="utf-8"?>
+<p:sld xmlns:a="http://schemas.openxmlformats.org/drawingml/2006/main" xmlns:r="http://schemas.openxmlformats.org/officeDocument/2006/relationships" xmlns:p="http://schemas.openxmlformats.org/presentationml/2006/main">
+  <p:cSld>
+    <p:spTree>
+      <p:nvGrpSpPr>
+        <p:cNvPr id="1" name=""/>
+        <p:cNvGrpSpPr/>
+        <p:nvPr/>
+      </p:nvGrpSpPr>
+      <p:grpSpPr>
+        <a:xfrm>
+          <a:off x="0" y="0"/>
+          <a:ext cx="0" cy="0"/>
+          <a:chOff x="0" y="0"/>
+          <a:chExt cx="0" cy="0"/>
+        </a:xfrm>
+      </p:grpSpPr>
+      <p:sp>
+        <p:nvSpPr>
+          <p:cNvPr id="2" name="Title 1"/>
+          <p:cNvSpPr>
+            <a:spLocks noGrp="1"/>
+          </p:cNvSpPr>
+          <p:nvPr>
+            <p:ph type="title"/>
+          </p:nvPr>
+        </p:nvSpPr>
+        <p:spPr/>
+        <p:txBody>
+          <a:bodyPr/>
+          <a:lstStyle/>
+          <a:p>
+            <a:r>
+              <a:rPr lang="en-US" dirty="0" smtClean="0"/>
+              <a:t>Future Work</a:t>
+            </a:r>
+            <a:endParaRPr lang="en-US" dirty="0"/>
+          </a:p>
+        </p:txBody>
+      </p:sp>
+      <p:sp>
+        <p:nvSpPr>
+          <p:cNvPr id="3" name="Content Placeholder 2"/>
+          <p:cNvSpPr>
+            <a:spLocks noGrp="1"/>
+          </p:cNvSpPr>
+          <p:nvPr>
+            <p:ph idx="1"/>
+          </p:nvPr>
+        </p:nvSpPr>
+        <p:spPr/>
+        <p:txBody>
+          <a:bodyPr>
+            <a:normAutofit lnSpcReduction="10000"/>
+          </a:bodyPr>
+          <a:lstStyle/>
+          <a:p>
+            <a:r>
+              <a:rPr lang="en-US" dirty="0"/>
+              <a:t>See if I can predict improvement in players across years.</a:t>
+            </a:r>
+          </a:p>
+          <a:p>
+            <a:r>
+              <a:rPr lang="en-US" dirty="0"/>
+              <a:t>Split apart field goals into 3 and 5 points. For now, just scored all field goals made as 3 points since I did not want to loop through all kickers of each game across the entire season to determine which kicks were longer than others.</a:t>
+            </a:r>
+          </a:p>
+          <a:p>
+            <a:r>
+              <a:rPr lang="en-US" dirty="0" smtClean="0"/>
+              <a:t>Aggregate individual players into team defenses </a:t>
+            </a:r>
+            <a:r>
+              <a:rPr lang="en-US" dirty="0"/>
+              <a:t>and pull a full team score across the season to further improve my rank predictions.</a:t>
+            </a:r>
+          </a:p>
+          <a:p>
+            <a:r>
+              <a:rPr lang="en-US" dirty="0"/>
+              <a:t>Try to draft position rank besides positions (e.g. WR1, WR2)</a:t>
+            </a:r>
+          </a:p>
+          <a:p>
+            <a:r>
+              <a:rPr lang="en-US" dirty="0"/>
+              <a:t>Turn this into a product with a user interface to select a player and determine their rank against other players. </a:t>
+            </a:r>
+            <a:r>
+              <a:rPr lang="en-US" dirty="0" smtClean="0"/>
+              <a:t>(Unfortunately</a:t>
+            </a:r>
+            <a:r>
+              <a:rPr lang="en-US" dirty="0"/>
+              <a:t>, while a good lesson, "who should I pick" already exists as a </a:t>
+            </a:r>
+            <a:r>
+              <a:rPr lang="en-US" dirty="0" smtClean="0"/>
+              <a:t>product</a:t>
+            </a:r>
+            <a:r>
+              <a:rPr lang="en-US" dirty="0"/>
+              <a:t>)</a:t>
+            </a:r>
+            <a:endParaRPr lang="en-US" dirty="0"/>
+          </a:p>
+        </p:txBody>
+      </p:sp>
+    </p:spTree>
+    <p:extLst>
+      <p:ext uri="{BB962C8B-B14F-4D97-AF65-F5344CB8AC3E}">
+        <p14:creationId xmlns:p14="http://schemas.microsoft.com/office/powerpoint/2010/main" val="879721755"/>
       </p:ext>
     </p:extLst>
   </p:cSld>
@@ -5132,15 +5356,149 @@
             <p:ph idx="1"/>
           </p:nvPr>
         </p:nvSpPr>
-        <p:spPr/>
-        <p:txBody>
-          <a:bodyPr/>
-          <a:lstStyle/>
+        <p:spPr>
+          <a:xfrm>
+            <a:off x="676657" y="2011680"/>
+            <a:ext cx="6987460" cy="3766185"/>
+          </a:xfrm>
+        </p:spPr>
+        <p:txBody>
+          <a:bodyPr/>
+          <a:lstStyle/>
+          <a:p>
+            <a:r>
+              <a:rPr lang="en-US" dirty="0" smtClean="0"/>
+              <a:t>Random Forest is </a:t>
+            </a:r>
+            <a:r>
+              <a:rPr lang="en-US" dirty="0"/>
+              <a:t>a quick preliminary model that </a:t>
+            </a:r>
+            <a:r>
+              <a:rPr lang="en-US" dirty="0" smtClean="0"/>
+              <a:t>can determine </a:t>
+            </a:r>
+            <a:r>
+              <a:rPr lang="en-US" dirty="0"/>
+              <a:t>important features without having to do feature scaling</a:t>
+            </a:r>
+            <a:r>
+              <a:rPr lang="en-US" dirty="0" smtClean="0"/>
+              <a:t>.</a:t>
+            </a:r>
+          </a:p>
           <a:p>
             <a:endParaRPr lang="en-US" dirty="0"/>
           </a:p>
-        </p:txBody>
-      </p:sp>
+          <a:p>
+            <a:r>
+              <a:rPr lang="en-US" dirty="0" err="1" smtClean="0"/>
+              <a:t>Totalpoints</a:t>
+            </a:r>
+            <a:r>
+              <a:rPr lang="en-US" dirty="0" smtClean="0"/>
+              <a:t>, receiving yards, and rushing yards are the most important features in this set. All appear to be negatively correlated with rank.</a:t>
+            </a:r>
+            <a:endParaRPr lang="en-US" dirty="0"/>
+          </a:p>
+        </p:txBody>
+      </p:sp>
+      <p:pic>
+        <p:nvPicPr>
+          <p:cNvPr id="5" name="Picture 4"/>
+          <p:cNvPicPr>
+            <a:picLocks noChangeAspect="1"/>
+          </p:cNvPicPr>
+          <p:nvPr/>
+        </p:nvPicPr>
+        <p:blipFill>
+          <a:blip r:embed="rId2"/>
+          <a:stretch>
+            <a:fillRect/>
+          </a:stretch>
+        </p:blipFill>
+        <p:spPr>
+          <a:xfrm>
+            <a:off x="8349934" y="147154"/>
+            <a:ext cx="3710861" cy="5880666"/>
+          </a:xfrm>
+          <a:prstGeom prst="rect">
+            <a:avLst/>
+          </a:prstGeom>
+        </p:spPr>
+      </p:pic>
+      <p:pic>
+        <p:nvPicPr>
+          <p:cNvPr id="6" name="Picture 5"/>
+          <p:cNvPicPr>
+            <a:picLocks noChangeAspect="1"/>
+          </p:cNvPicPr>
+          <p:nvPr/>
+        </p:nvPicPr>
+        <p:blipFill>
+          <a:blip r:embed="rId3"/>
+          <a:stretch>
+            <a:fillRect/>
+          </a:stretch>
+        </p:blipFill>
+        <p:spPr>
+          <a:xfrm>
+            <a:off x="204281" y="4740688"/>
+            <a:ext cx="2735709" cy="1806997"/>
+          </a:xfrm>
+          <a:prstGeom prst="rect">
+            <a:avLst/>
+          </a:prstGeom>
+        </p:spPr>
+      </p:pic>
+      <p:pic>
+        <p:nvPicPr>
+          <p:cNvPr id="7" name="Picture 6"/>
+          <p:cNvPicPr>
+            <a:picLocks noChangeAspect="1"/>
+          </p:cNvPicPr>
+          <p:nvPr/>
+        </p:nvPicPr>
+        <p:blipFill>
+          <a:blip r:embed="rId4"/>
+          <a:stretch>
+            <a:fillRect/>
+          </a:stretch>
+        </p:blipFill>
+        <p:spPr>
+          <a:xfrm>
+            <a:off x="2988118" y="4740688"/>
+            <a:ext cx="2736066" cy="1806997"/>
+          </a:xfrm>
+          <a:prstGeom prst="rect">
+            <a:avLst/>
+          </a:prstGeom>
+        </p:spPr>
+      </p:pic>
+      <p:pic>
+        <p:nvPicPr>
+          <p:cNvPr id="8" name="Picture 7"/>
+          <p:cNvPicPr>
+            <a:picLocks noChangeAspect="1"/>
+          </p:cNvPicPr>
+          <p:nvPr/>
+        </p:nvPicPr>
+        <p:blipFill>
+          <a:blip r:embed="rId5"/>
+          <a:stretch>
+            <a:fillRect/>
+          </a:stretch>
+        </p:blipFill>
+        <p:spPr>
+          <a:xfrm>
+            <a:off x="5784578" y="4740688"/>
+            <a:ext cx="2708172" cy="1777370"/>
+          </a:xfrm>
+          <a:prstGeom prst="rect">
+            <a:avLst/>
+          </a:prstGeom>
+        </p:spPr>
+      </p:pic>
     </p:spTree>
     <p:extLst>
       <p:ext uri="{BB962C8B-B14F-4D97-AF65-F5344CB8AC3E}">

</xml_diff>